<commit_message>
final presentation and Doc
</commit_message>
<xml_diff>
--- a/presentation/ballwall.pptx
+++ b/presentation/ballwall.pptx
@@ -18,15 +18,11 @@
     <p:sldId id="268" r:id="rId12"/>
     <p:sldId id="276" r:id="rId13"/>
     <p:sldId id="269" r:id="rId14"/>
-    <p:sldId id="270" r:id="rId15"/>
-    <p:sldId id="260" r:id="rId16"/>
-    <p:sldId id="265" r:id="rId17"/>
-    <p:sldId id="271" r:id="rId18"/>
-    <p:sldId id="272" r:id="rId19"/>
-    <p:sldId id="262" r:id="rId20"/>
-    <p:sldId id="264" r:id="rId21"/>
-    <p:sldId id="263" r:id="rId22"/>
-    <p:sldId id="277" r:id="rId23"/>
+    <p:sldId id="260" r:id="rId15"/>
+    <p:sldId id="265" r:id="rId16"/>
+    <p:sldId id="278" r:id="rId17"/>
+    <p:sldId id="263" r:id="rId18"/>
+    <p:sldId id="277" r:id="rId19"/>
   </p:sldIdLst>
   <p:sldSz cx="12192000" cy="6858000"/>
   <p:notesSz cx="6858000" cy="9144000"/>
@@ -361,7 +357,7 @@
           <a:p>
             <a:fld id="{19989466-504B-4804-90BA-42AAF5AF4E6F}" type="datetimeFigureOut">
               <a:rPr lang="de-AT" smtClean="0"/>
-              <a:t>15.06.2021</a:t>
+              <a:t>23.06.2021</a:t>
             </a:fld>
             <a:endParaRPr lang="de-AT"/>
           </a:p>
@@ -569,7 +565,7 @@
           <a:p>
             <a:fld id="{19989466-504B-4804-90BA-42AAF5AF4E6F}" type="datetimeFigureOut">
               <a:rPr lang="de-AT" smtClean="0"/>
-              <a:t>15.06.2021</a:t>
+              <a:t>23.06.2021</a:t>
             </a:fld>
             <a:endParaRPr lang="de-AT"/>
           </a:p>
@@ -827,7 +823,7 @@
           <a:p>
             <a:fld id="{19989466-504B-4804-90BA-42AAF5AF4E6F}" type="datetimeFigureOut">
               <a:rPr lang="de-AT" smtClean="0"/>
-              <a:t>15.06.2021</a:t>
+              <a:t>23.06.2021</a:t>
             </a:fld>
             <a:endParaRPr lang="de-AT"/>
           </a:p>
@@ -997,7 +993,7 @@
           <a:p>
             <a:fld id="{19989466-504B-4804-90BA-42AAF5AF4E6F}" type="datetimeFigureOut">
               <a:rPr lang="de-AT" smtClean="0"/>
-              <a:t>15.06.2021</a:t>
+              <a:t>23.06.2021</a:t>
             </a:fld>
             <a:endParaRPr lang="de-AT"/>
           </a:p>
@@ -1334,7 +1330,7 @@
           <a:p>
             <a:fld id="{19989466-504B-4804-90BA-42AAF5AF4E6F}" type="datetimeFigureOut">
               <a:rPr lang="de-AT" smtClean="0"/>
-              <a:t>15.06.2021</a:t>
+              <a:t>23.06.2021</a:t>
             </a:fld>
             <a:endParaRPr lang="de-AT"/>
           </a:p>
@@ -1609,7 +1605,7 @@
           <a:p>
             <a:fld id="{19989466-504B-4804-90BA-42AAF5AF4E6F}" type="datetimeFigureOut">
               <a:rPr lang="de-AT" smtClean="0"/>
-              <a:t>15.06.2021</a:t>
+              <a:t>23.06.2021</a:t>
             </a:fld>
             <a:endParaRPr lang="de-AT"/>
           </a:p>
@@ -1988,7 +1984,7 @@
           <a:p>
             <a:fld id="{19989466-504B-4804-90BA-42AAF5AF4E6F}" type="datetimeFigureOut">
               <a:rPr lang="de-AT" smtClean="0"/>
-              <a:t>15.06.2021</a:t>
+              <a:t>23.06.2021</a:t>
             </a:fld>
             <a:endParaRPr lang="de-AT"/>
           </a:p>
@@ -2106,7 +2102,7 @@
           <a:p>
             <a:fld id="{19989466-504B-4804-90BA-42AAF5AF4E6F}" type="datetimeFigureOut">
               <a:rPr lang="de-AT" smtClean="0"/>
-              <a:t>15.06.2021</a:t>
+              <a:t>23.06.2021</a:t>
             </a:fld>
             <a:endParaRPr lang="de-AT"/>
           </a:p>
@@ -2279,7 +2275,7 @@
           <a:p>
             <a:fld id="{19989466-504B-4804-90BA-42AAF5AF4E6F}" type="datetimeFigureOut">
               <a:rPr lang="de-AT" smtClean="0"/>
-              <a:t>15.06.2021</a:t>
+              <a:t>23.06.2021</a:t>
             </a:fld>
             <a:endParaRPr lang="de-AT"/>
           </a:p>
@@ -2635,7 +2631,7 @@
           <a:p>
             <a:fld id="{19989466-504B-4804-90BA-42AAF5AF4E6F}" type="datetimeFigureOut">
               <a:rPr lang="de-AT" smtClean="0"/>
-              <a:t>15.06.2021</a:t>
+              <a:t>23.06.2021</a:t>
             </a:fld>
             <a:endParaRPr lang="de-AT"/>
           </a:p>
@@ -3014,7 +3010,7 @@
           <a:p>
             <a:fld id="{19989466-504B-4804-90BA-42AAF5AF4E6F}" type="datetimeFigureOut">
               <a:rPr lang="de-AT" smtClean="0"/>
-              <a:t>15.06.2021</a:t>
+              <a:t>23.06.2021</a:t>
             </a:fld>
             <a:endParaRPr lang="de-AT"/>
           </a:p>
@@ -3303,7 +3299,7 @@
           <a:p>
             <a:fld id="{19989466-504B-4804-90BA-42AAF5AF4E6F}" type="datetimeFigureOut">
               <a:rPr lang="de-AT" smtClean="0"/>
-              <a:t>15.06.2021</a:t>
+              <a:t>23.06.2021</a:t>
             </a:fld>
             <a:endParaRPr lang="de-AT"/>
           </a:p>
@@ -4061,7 +4057,7 @@
                 <a:latin typeface="Times New Roman" panose="02020603050405020304" pitchFamily="18" charset="0"/>
                 <a:cs typeface="Times New Roman" panose="02020603050405020304" pitchFamily="18" charset="0"/>
               </a:rPr>
-              <a:t> done in three main steps</a:t>
+              <a:t> done in two main steps</a:t>
             </a:r>
             <a:endParaRPr lang="de-AT" dirty="0">
               <a:latin typeface="Times New Roman" panose="02020603050405020304" pitchFamily="18" charset="0"/>
@@ -5175,397 +5171,6 @@
 </file>
 
 <file path=ppt/slides/slide14.xml><?xml version="1.0" encoding="utf-8"?>
-<p:sld xmlns:a="http://schemas.openxmlformats.org/drawingml/2006/main" xmlns:r="http://schemas.openxmlformats.org/officeDocument/2006/relationships" xmlns:p="http://schemas.openxmlformats.org/presentationml/2006/main">
-  <p:cSld>
-    <p:bg>
-      <p:bgPr>
-        <a:solidFill>
-          <a:schemeClr val="bg2"/>
-        </a:solidFill>
-        <a:effectLst/>
-      </p:bgPr>
-    </p:bg>
-    <p:spTree>
-      <p:nvGrpSpPr>
-        <p:cNvPr id="1" name=""/>
-        <p:cNvGrpSpPr/>
-        <p:nvPr/>
-      </p:nvGrpSpPr>
-      <p:grpSpPr>
-        <a:xfrm>
-          <a:off x="0" y="0"/>
-          <a:ext cx="0" cy="0"/>
-          <a:chOff x="0" y="0"/>
-          <a:chExt cx="0" cy="0"/>
-        </a:xfrm>
-      </p:grpSpPr>
-      <p:sp>
-        <p:nvSpPr>
-          <p:cNvPr id="38" name="Rectangle 37">
-            <a:extLst>
-              <a:ext uri="{FF2B5EF4-FFF2-40B4-BE49-F238E27FC236}">
-                <a16:creationId xmlns:a16="http://schemas.microsoft.com/office/drawing/2014/main" id="{C1CEA5B3-F026-4EA7-8ECF-E1F5465E5684}"/>
-              </a:ext>
-              <a:ext uri="{C183D7F6-B498-43B3-948B-1728B52AA6E4}">
-                <adec:decorative xmlns:adec="http://schemas.microsoft.com/office/drawing/2017/decorative" val="1"/>
-              </a:ext>
-            </a:extLst>
-          </p:cNvPr>
-          <p:cNvSpPr>
-            <a:spLocks noGrp="1" noRot="1" noChangeAspect="1" noMove="1" noResize="1" noEditPoints="1" noAdjustHandles="1" noChangeArrowheads="1" noChangeShapeType="1" noTextEdit="1"/>
-          </p:cNvSpPr>
-          <p:nvPr>
-            <p:extLst>
-              <p:ext uri="{386F3935-93C4-4BCD-93E2-E3B085C9AB24}">
-                <p16:designElem xmlns:p16="http://schemas.microsoft.com/office/powerpoint/2015/main" val="1"/>
-              </p:ext>
-            </p:extLst>
-          </p:nvPr>
-        </p:nvSpPr>
-        <p:spPr>
-          <a:xfrm>
-            <a:off x="3175" y="6400800"/>
-            <a:ext cx="12188825" cy="457200"/>
-          </a:xfrm>
-          <a:prstGeom prst="rect">
-            <a:avLst/>
-          </a:prstGeom>
-          <a:solidFill>
-            <a:schemeClr val="accent1">
-              <a:lumMod val="50000"/>
-            </a:schemeClr>
-          </a:solidFill>
-          <a:ln>
-            <a:noFill/>
-          </a:ln>
-        </p:spPr>
-        <p:style>
-          <a:lnRef idx="2">
-            <a:schemeClr val="accent1">
-              <a:shade val="50000"/>
-            </a:schemeClr>
-          </a:lnRef>
-          <a:fillRef idx="1">
-            <a:schemeClr val="accent1"/>
-          </a:fillRef>
-          <a:effectRef idx="0">
-            <a:schemeClr val="accent1"/>
-          </a:effectRef>
-          <a:fontRef idx="minor">
-            <a:schemeClr val="lt1"/>
-          </a:fontRef>
-        </p:style>
-      </p:sp>
-      <p:sp>
-        <p:nvSpPr>
-          <p:cNvPr id="40" name="Rectangle 39">
-            <a:extLst>
-              <a:ext uri="{FF2B5EF4-FFF2-40B4-BE49-F238E27FC236}">
-                <a16:creationId xmlns:a16="http://schemas.microsoft.com/office/drawing/2014/main" id="{4B486FE1-17CE-45A4-9CBC-8C0B185E1963}"/>
-              </a:ext>
-              <a:ext uri="{C183D7F6-B498-43B3-948B-1728B52AA6E4}">
-                <adec:decorative xmlns:adec="http://schemas.microsoft.com/office/drawing/2017/decorative" val="1"/>
-              </a:ext>
-            </a:extLst>
-          </p:cNvPr>
-          <p:cNvSpPr>
-            <a:spLocks noGrp="1" noRot="1" noChangeAspect="1" noMove="1" noResize="1" noEditPoints="1" noAdjustHandles="1" noChangeArrowheads="1" noChangeShapeType="1" noTextEdit="1"/>
-          </p:cNvSpPr>
-          <p:nvPr>
-            <p:extLst>
-              <p:ext uri="{386F3935-93C4-4BCD-93E2-E3B085C9AB24}">
-                <p16:designElem xmlns:p16="http://schemas.microsoft.com/office/powerpoint/2015/main" val="1"/>
-              </p:ext>
-            </p:extLst>
-          </p:nvPr>
-        </p:nvSpPr>
-        <p:spPr>
-          <a:xfrm>
-            <a:off x="15" y="6334316"/>
-            <a:ext cx="12188825" cy="64008"/>
-          </a:xfrm>
-          <a:prstGeom prst="rect">
-            <a:avLst/>
-          </a:prstGeom>
-          <a:solidFill>
-            <a:schemeClr val="accent1"/>
-          </a:solidFill>
-          <a:ln>
-            <a:noFill/>
-          </a:ln>
-        </p:spPr>
-        <p:style>
-          <a:lnRef idx="2">
-            <a:schemeClr val="accent1">
-              <a:shade val="50000"/>
-            </a:schemeClr>
-          </a:lnRef>
-          <a:fillRef idx="1">
-            <a:schemeClr val="accent1"/>
-          </a:fillRef>
-          <a:effectRef idx="0">
-            <a:schemeClr val="accent1"/>
-          </a:effectRef>
-          <a:fontRef idx="minor">
-            <a:schemeClr val="lt1"/>
-          </a:fontRef>
-        </p:style>
-      </p:sp>
-      <p:cxnSp>
-        <p:nvCxnSpPr>
-          <p:cNvPr id="42" name="Straight Connector 41">
-            <a:extLst>
-              <a:ext uri="{FF2B5EF4-FFF2-40B4-BE49-F238E27FC236}">
-                <a16:creationId xmlns:a16="http://schemas.microsoft.com/office/drawing/2014/main" id="{2AF0217B-4943-4BF1-8CDF-A5FB04C876DA}"/>
-              </a:ext>
-              <a:ext uri="{C183D7F6-B498-43B3-948B-1728B52AA6E4}">
-                <adec:decorative xmlns:adec="http://schemas.microsoft.com/office/drawing/2017/decorative" val="1"/>
-              </a:ext>
-            </a:extLst>
-          </p:cNvPr>
-          <p:cNvCxnSpPr>
-            <a:cxnSpLocks noGrp="1" noRot="1" noChangeAspect="1" noMove="1" noResize="1" noEditPoints="1" noAdjustHandles="1" noChangeArrowheads="1" noChangeShapeType="1"/>
-          </p:cNvCxnSpPr>
-          <p:nvPr>
-            <p:extLst>
-              <p:ext uri="{386F3935-93C4-4BCD-93E2-E3B085C9AB24}">
-                <p16:designElem xmlns:p16="http://schemas.microsoft.com/office/powerpoint/2015/main" val="1"/>
-              </p:ext>
-            </p:extLst>
-          </p:nvPr>
-        </p:nvCxnSpPr>
-        <p:spPr>
-          <a:xfrm>
-            <a:off x="1207658" y="4343400"/>
-            <a:ext cx="9875520" cy="0"/>
-          </a:xfrm>
-          <a:prstGeom prst="line">
-            <a:avLst/>
-          </a:prstGeom>
-          <a:ln w="6350">
-            <a:solidFill>
-              <a:schemeClr val="tx1">
-                <a:lumMod val="50000"/>
-                <a:lumOff val="50000"/>
-              </a:schemeClr>
-            </a:solidFill>
-          </a:ln>
-        </p:spPr>
-        <p:style>
-          <a:lnRef idx="1">
-            <a:schemeClr val="accent1"/>
-          </a:lnRef>
-          <a:fillRef idx="0">
-            <a:schemeClr val="accent1"/>
-          </a:fillRef>
-          <a:effectRef idx="0">
-            <a:schemeClr val="accent1"/>
-          </a:effectRef>
-          <a:fontRef idx="minor">
-            <a:schemeClr val="tx1"/>
-          </a:fontRef>
-        </p:style>
-      </p:cxnSp>
-      <p:sp>
-        <p:nvSpPr>
-          <p:cNvPr id="44" name="Rectangle 43">
-            <a:extLst>
-              <a:ext uri="{FF2B5EF4-FFF2-40B4-BE49-F238E27FC236}">
-                <a16:creationId xmlns:a16="http://schemas.microsoft.com/office/drawing/2014/main" id="{947A5FA4-F7D9-4BD2-BCEA-016B70DC8E02}"/>
-              </a:ext>
-              <a:ext uri="{C183D7F6-B498-43B3-948B-1728B52AA6E4}">
-                <adec:decorative xmlns:adec="http://schemas.microsoft.com/office/drawing/2017/decorative" val="1"/>
-              </a:ext>
-            </a:extLst>
-          </p:cNvPr>
-          <p:cNvSpPr>
-            <a:spLocks noGrp="1" noRot="1" noChangeAspect="1" noMove="1" noResize="1" noEditPoints="1" noAdjustHandles="1" noChangeArrowheads="1" noChangeShapeType="1" noTextEdit="1"/>
-          </p:cNvSpPr>
-          <p:nvPr>
-            <p:extLst>
-              <p:ext uri="{386F3935-93C4-4BCD-93E2-E3B085C9AB24}">
-                <p16:designElem xmlns:p16="http://schemas.microsoft.com/office/powerpoint/2015/main" val="1"/>
-              </p:ext>
-            </p:extLst>
-          </p:nvPr>
-        </p:nvSpPr>
-        <p:spPr bwMode="white">
-          <a:xfrm>
-            <a:off x="1507" y="4953000"/>
-            <a:ext cx="12188952" cy="1905000"/>
-          </a:xfrm>
-          <a:prstGeom prst="rect">
-            <a:avLst/>
-          </a:prstGeom>
-          <a:solidFill>
-            <a:schemeClr val="accent1">
-              <a:lumMod val="50000"/>
-            </a:schemeClr>
-          </a:solidFill>
-          <a:ln>
-            <a:noFill/>
-          </a:ln>
-        </p:spPr>
-        <p:style>
-          <a:lnRef idx="2">
-            <a:schemeClr val="accent1">
-              <a:shade val="50000"/>
-            </a:schemeClr>
-          </a:lnRef>
-          <a:fillRef idx="1">
-            <a:schemeClr val="accent1"/>
-          </a:fillRef>
-          <a:effectRef idx="0">
-            <a:schemeClr val="accent1"/>
-          </a:effectRef>
-          <a:fontRef idx="minor">
-            <a:schemeClr val="lt1"/>
-          </a:fontRef>
-        </p:style>
-      </p:sp>
-      <p:sp>
-        <p:nvSpPr>
-          <p:cNvPr id="2" name="Titel 1">
-            <a:extLst>
-              <a:ext uri="{FF2B5EF4-FFF2-40B4-BE49-F238E27FC236}">
-                <a16:creationId xmlns:a16="http://schemas.microsoft.com/office/drawing/2014/main" id="{813CBFB9-7F76-4A9D-908B-14CE62DBDD92}"/>
-              </a:ext>
-            </a:extLst>
-          </p:cNvPr>
-          <p:cNvSpPr>
-            <a:spLocks noGrp="1"/>
-          </p:cNvSpPr>
-          <p:nvPr>
-            <p:ph type="title"/>
-          </p:nvPr>
-        </p:nvSpPr>
-        <p:spPr>
-          <a:xfrm>
-            <a:off x="1065197" y="5120640"/>
-            <a:ext cx="10058400" cy="822960"/>
-          </a:xfrm>
-        </p:spPr>
-        <p:txBody>
-          <a:bodyPr vert="horz" lIns="91440" tIns="45720" rIns="91440" bIns="45720" rtlCol="0" anchor="b">
-            <a:normAutofit/>
-          </a:bodyPr>
-          <a:lstStyle/>
-          <a:p>
-            <a:r>
-              <a:rPr lang="en-US" sz="3600">
-                <a:solidFill>
-                  <a:srgbClr val="FFFFFF"/>
-                </a:solidFill>
-              </a:rPr>
-              <a:t>Creating the sphere: 3.step</a:t>
-            </a:r>
-          </a:p>
-        </p:txBody>
-      </p:sp>
-      <p:sp>
-        <p:nvSpPr>
-          <p:cNvPr id="46" name="Rectangle 45">
-            <a:extLst>
-              <a:ext uri="{FF2B5EF4-FFF2-40B4-BE49-F238E27FC236}">
-                <a16:creationId xmlns:a16="http://schemas.microsoft.com/office/drawing/2014/main" id="{D5AADE08-A85D-4367-AF35-82927B65BCD5}"/>
-              </a:ext>
-              <a:ext uri="{C183D7F6-B498-43B3-948B-1728B52AA6E4}">
-                <adec:decorative xmlns:adec="http://schemas.microsoft.com/office/drawing/2017/decorative" val="1"/>
-              </a:ext>
-            </a:extLst>
-          </p:cNvPr>
-          <p:cNvSpPr>
-            <a:spLocks noGrp="1" noRot="1" noChangeAspect="1" noMove="1" noResize="1" noEditPoints="1" noAdjustHandles="1" noChangeArrowheads="1" noChangeShapeType="1" noTextEdit="1"/>
-          </p:cNvSpPr>
-          <p:nvPr>
-            <p:extLst>
-              <p:ext uri="{386F3935-93C4-4BCD-93E2-E3B085C9AB24}">
-                <p16:designElem xmlns:p16="http://schemas.microsoft.com/office/powerpoint/2015/main" val="1"/>
-              </p:ext>
-            </p:extLst>
-          </p:nvPr>
-        </p:nvSpPr>
-        <p:spPr>
-          <a:xfrm>
-            <a:off x="1507" y="4906176"/>
-            <a:ext cx="12188952" cy="64008"/>
-          </a:xfrm>
-          <a:prstGeom prst="rect">
-            <a:avLst/>
-          </a:prstGeom>
-          <a:solidFill>
-            <a:schemeClr val="accent1"/>
-          </a:solidFill>
-          <a:ln>
-            <a:noFill/>
-          </a:ln>
-        </p:spPr>
-        <p:style>
-          <a:lnRef idx="2">
-            <a:schemeClr val="accent1">
-              <a:shade val="50000"/>
-            </a:schemeClr>
-          </a:lnRef>
-          <a:fillRef idx="1">
-            <a:schemeClr val="accent1"/>
-          </a:fillRef>
-          <a:effectRef idx="0">
-            <a:schemeClr val="accent1"/>
-          </a:effectRef>
-          <a:fontRef idx="minor">
-            <a:schemeClr val="lt1"/>
-          </a:fontRef>
-        </p:style>
-      </p:sp>
-      <p:pic>
-        <p:nvPicPr>
-          <p:cNvPr id="11" name="Inhaltsplatzhalter 10" descr="Ein Bild, das Text enthält.&#10;&#10;Automatisch generierte Beschreibung">
-            <a:extLst>
-              <a:ext uri="{FF2B5EF4-FFF2-40B4-BE49-F238E27FC236}">
-                <a16:creationId xmlns:a16="http://schemas.microsoft.com/office/drawing/2014/main" id="{607388EC-9D73-4DC2-A649-E5B9AC37C99B}"/>
-              </a:ext>
-            </a:extLst>
-          </p:cNvPr>
-          <p:cNvPicPr>
-            <a:picLocks noGrp="1" noChangeAspect="1"/>
-          </p:cNvPicPr>
-          <p:nvPr>
-            <p:ph idx="1"/>
-          </p:nvPr>
-        </p:nvPicPr>
-        <p:blipFill>
-          <a:blip r:embed="rId2">
-            <a:extLst>
-              <a:ext uri="{28A0092B-C50C-407E-A947-70E740481C1C}">
-                <a14:useLocalDpi xmlns:a14="http://schemas.microsoft.com/office/drawing/2010/main" val="0"/>
-              </a:ext>
-            </a:extLst>
-          </a:blip>
-          <a:stretch>
-            <a:fillRect/>
-          </a:stretch>
-        </p:blipFill>
-        <p:spPr>
-          <a:xfrm>
-            <a:off x="-3975" y="78948"/>
-            <a:ext cx="12192815" cy="4752000"/>
-          </a:xfrm>
-        </p:spPr>
-      </p:pic>
-    </p:spTree>
-    <p:extLst>
-      <p:ext uri="{BB962C8B-B14F-4D97-AF65-F5344CB8AC3E}">
-        <p14:creationId xmlns:p14="http://schemas.microsoft.com/office/powerpoint/2010/main" val="2516939678"/>
-      </p:ext>
-    </p:extLst>
-  </p:cSld>
-  <p:clrMapOvr>
-    <a:masterClrMapping/>
-  </p:clrMapOvr>
-</p:sld>
-</file>
-
-<file path=ppt/slides/slide15.xml><?xml version="1.0" encoding="utf-8"?>
 <p:sld xmlns:a="http://schemas.openxmlformats.org/drawingml/2006/main" xmlns:r="http://schemas.openxmlformats.org/officeDocument/2006/relationships" xmlns:p="http://schemas.openxmlformats.org/presentationml/2006/main" showMasterSp="0">
   <p:cSld>
     <p:bg>
@@ -6143,7 +5748,7 @@
 </p:sld>
 </file>
 
-<file path=ppt/slides/slide16.xml><?xml version="1.0" encoding="utf-8"?>
+<file path=ppt/slides/slide15.xml><?xml version="1.0" encoding="utf-8"?>
 <p:sld xmlns:a="http://schemas.openxmlformats.org/drawingml/2006/main" xmlns:r="http://schemas.openxmlformats.org/officeDocument/2006/relationships" xmlns:p="http://schemas.openxmlformats.org/presentationml/2006/main">
   <p:cSld>
     <p:bg>
@@ -6536,398 +6141,7 @@
 </p:sld>
 </file>
 
-<file path=ppt/slides/slide17.xml><?xml version="1.0" encoding="utf-8"?>
-<p:sld xmlns:a="http://schemas.openxmlformats.org/drawingml/2006/main" xmlns:r="http://schemas.openxmlformats.org/officeDocument/2006/relationships" xmlns:p="http://schemas.openxmlformats.org/presentationml/2006/main">
-  <p:cSld>
-    <p:bg>
-      <p:bgPr>
-        <a:solidFill>
-          <a:schemeClr val="bg2"/>
-        </a:solidFill>
-        <a:effectLst/>
-      </p:bgPr>
-    </p:bg>
-    <p:spTree>
-      <p:nvGrpSpPr>
-        <p:cNvPr id="1" name=""/>
-        <p:cNvGrpSpPr/>
-        <p:nvPr/>
-      </p:nvGrpSpPr>
-      <p:grpSpPr>
-        <a:xfrm>
-          <a:off x="0" y="0"/>
-          <a:ext cx="0" cy="0"/>
-          <a:chOff x="0" y="0"/>
-          <a:chExt cx="0" cy="0"/>
-        </a:xfrm>
-      </p:grpSpPr>
-      <p:sp>
-        <p:nvSpPr>
-          <p:cNvPr id="10" name="Rectangle 9">
-            <a:extLst>
-              <a:ext uri="{FF2B5EF4-FFF2-40B4-BE49-F238E27FC236}">
-                <a16:creationId xmlns:a16="http://schemas.microsoft.com/office/drawing/2014/main" id="{C1CEA5B3-F026-4EA7-8ECF-E1F5465E5684}"/>
-              </a:ext>
-              <a:ext uri="{C183D7F6-B498-43B3-948B-1728B52AA6E4}">
-                <adec:decorative xmlns:adec="http://schemas.microsoft.com/office/drawing/2017/decorative" val="1"/>
-              </a:ext>
-            </a:extLst>
-          </p:cNvPr>
-          <p:cNvSpPr>
-            <a:spLocks noGrp="1" noRot="1" noChangeAspect="1" noMove="1" noResize="1" noEditPoints="1" noAdjustHandles="1" noChangeArrowheads="1" noChangeShapeType="1" noTextEdit="1"/>
-          </p:cNvSpPr>
-          <p:nvPr>
-            <p:extLst>
-              <p:ext uri="{386F3935-93C4-4BCD-93E2-E3B085C9AB24}">
-                <p16:designElem xmlns:p16="http://schemas.microsoft.com/office/powerpoint/2015/main" val="1"/>
-              </p:ext>
-            </p:extLst>
-          </p:nvPr>
-        </p:nvSpPr>
-        <p:spPr>
-          <a:xfrm>
-            <a:off x="3175" y="6400800"/>
-            <a:ext cx="12188825" cy="457200"/>
-          </a:xfrm>
-          <a:prstGeom prst="rect">
-            <a:avLst/>
-          </a:prstGeom>
-          <a:solidFill>
-            <a:schemeClr val="accent1">
-              <a:lumMod val="50000"/>
-            </a:schemeClr>
-          </a:solidFill>
-          <a:ln>
-            <a:noFill/>
-          </a:ln>
-        </p:spPr>
-        <p:style>
-          <a:lnRef idx="2">
-            <a:schemeClr val="accent1">
-              <a:shade val="50000"/>
-            </a:schemeClr>
-          </a:lnRef>
-          <a:fillRef idx="1">
-            <a:schemeClr val="accent1"/>
-          </a:fillRef>
-          <a:effectRef idx="0">
-            <a:schemeClr val="accent1"/>
-          </a:effectRef>
-          <a:fontRef idx="minor">
-            <a:schemeClr val="lt1"/>
-          </a:fontRef>
-        </p:style>
-      </p:sp>
-      <p:sp>
-        <p:nvSpPr>
-          <p:cNvPr id="12" name="Rectangle 11">
-            <a:extLst>
-              <a:ext uri="{FF2B5EF4-FFF2-40B4-BE49-F238E27FC236}">
-                <a16:creationId xmlns:a16="http://schemas.microsoft.com/office/drawing/2014/main" id="{4B486FE1-17CE-45A4-9CBC-8C0B185E1963}"/>
-              </a:ext>
-              <a:ext uri="{C183D7F6-B498-43B3-948B-1728B52AA6E4}">
-                <adec:decorative xmlns:adec="http://schemas.microsoft.com/office/drawing/2017/decorative" val="1"/>
-              </a:ext>
-            </a:extLst>
-          </p:cNvPr>
-          <p:cNvSpPr>
-            <a:spLocks noGrp="1" noRot="1" noChangeAspect="1" noMove="1" noResize="1" noEditPoints="1" noAdjustHandles="1" noChangeArrowheads="1" noChangeShapeType="1" noTextEdit="1"/>
-          </p:cNvSpPr>
-          <p:nvPr>
-            <p:extLst>
-              <p:ext uri="{386F3935-93C4-4BCD-93E2-E3B085C9AB24}">
-                <p16:designElem xmlns:p16="http://schemas.microsoft.com/office/powerpoint/2015/main" val="1"/>
-              </p:ext>
-            </p:extLst>
-          </p:nvPr>
-        </p:nvSpPr>
-        <p:spPr>
-          <a:xfrm>
-            <a:off x="15" y="6334316"/>
-            <a:ext cx="12188825" cy="64008"/>
-          </a:xfrm>
-          <a:prstGeom prst="rect">
-            <a:avLst/>
-          </a:prstGeom>
-          <a:solidFill>
-            <a:schemeClr val="accent1"/>
-          </a:solidFill>
-          <a:ln>
-            <a:noFill/>
-          </a:ln>
-        </p:spPr>
-        <p:style>
-          <a:lnRef idx="2">
-            <a:schemeClr val="accent1">
-              <a:shade val="50000"/>
-            </a:schemeClr>
-          </a:lnRef>
-          <a:fillRef idx="1">
-            <a:schemeClr val="accent1"/>
-          </a:fillRef>
-          <a:effectRef idx="0">
-            <a:schemeClr val="accent1"/>
-          </a:effectRef>
-          <a:fontRef idx="minor">
-            <a:schemeClr val="lt1"/>
-          </a:fontRef>
-        </p:style>
-      </p:sp>
-      <p:cxnSp>
-        <p:nvCxnSpPr>
-          <p:cNvPr id="14" name="Straight Connector 13">
-            <a:extLst>
-              <a:ext uri="{FF2B5EF4-FFF2-40B4-BE49-F238E27FC236}">
-                <a16:creationId xmlns:a16="http://schemas.microsoft.com/office/drawing/2014/main" id="{2AF0217B-4943-4BF1-8CDF-A5FB04C876DA}"/>
-              </a:ext>
-              <a:ext uri="{C183D7F6-B498-43B3-948B-1728B52AA6E4}">
-                <adec:decorative xmlns:adec="http://schemas.microsoft.com/office/drawing/2017/decorative" val="1"/>
-              </a:ext>
-            </a:extLst>
-          </p:cNvPr>
-          <p:cNvCxnSpPr>
-            <a:cxnSpLocks noGrp="1" noRot="1" noChangeAspect="1" noMove="1" noResize="1" noEditPoints="1" noAdjustHandles="1" noChangeArrowheads="1" noChangeShapeType="1"/>
-          </p:cNvCxnSpPr>
-          <p:nvPr>
-            <p:extLst>
-              <p:ext uri="{386F3935-93C4-4BCD-93E2-E3B085C9AB24}">
-                <p16:designElem xmlns:p16="http://schemas.microsoft.com/office/powerpoint/2015/main" val="1"/>
-              </p:ext>
-            </p:extLst>
-          </p:nvPr>
-        </p:nvCxnSpPr>
-        <p:spPr>
-          <a:xfrm>
-            <a:off x="1207658" y="4343400"/>
-            <a:ext cx="9875520" cy="0"/>
-          </a:xfrm>
-          <a:prstGeom prst="line">
-            <a:avLst/>
-          </a:prstGeom>
-          <a:ln w="6350">
-            <a:solidFill>
-              <a:schemeClr val="tx1">
-                <a:lumMod val="50000"/>
-                <a:lumOff val="50000"/>
-              </a:schemeClr>
-            </a:solidFill>
-          </a:ln>
-        </p:spPr>
-        <p:style>
-          <a:lnRef idx="1">
-            <a:schemeClr val="accent1"/>
-          </a:lnRef>
-          <a:fillRef idx="0">
-            <a:schemeClr val="accent1"/>
-          </a:fillRef>
-          <a:effectRef idx="0">
-            <a:schemeClr val="accent1"/>
-          </a:effectRef>
-          <a:fontRef idx="minor">
-            <a:schemeClr val="tx1"/>
-          </a:fontRef>
-        </p:style>
-      </p:cxnSp>
-      <p:sp>
-        <p:nvSpPr>
-          <p:cNvPr id="16" name="Rectangle 15">
-            <a:extLst>
-              <a:ext uri="{FF2B5EF4-FFF2-40B4-BE49-F238E27FC236}">
-                <a16:creationId xmlns:a16="http://schemas.microsoft.com/office/drawing/2014/main" id="{947A5FA4-F7D9-4BD2-BCEA-016B70DC8E02}"/>
-              </a:ext>
-              <a:ext uri="{C183D7F6-B498-43B3-948B-1728B52AA6E4}">
-                <adec:decorative xmlns:adec="http://schemas.microsoft.com/office/drawing/2017/decorative" val="1"/>
-              </a:ext>
-            </a:extLst>
-          </p:cNvPr>
-          <p:cNvSpPr>
-            <a:spLocks noGrp="1" noRot="1" noChangeAspect="1" noMove="1" noResize="1" noEditPoints="1" noAdjustHandles="1" noChangeArrowheads="1" noChangeShapeType="1" noTextEdit="1"/>
-          </p:cNvSpPr>
-          <p:nvPr>
-            <p:extLst>
-              <p:ext uri="{386F3935-93C4-4BCD-93E2-E3B085C9AB24}">
-                <p16:designElem xmlns:p16="http://schemas.microsoft.com/office/powerpoint/2015/main" val="1"/>
-              </p:ext>
-            </p:extLst>
-          </p:nvPr>
-        </p:nvSpPr>
-        <p:spPr bwMode="white">
-          <a:xfrm>
-            <a:off x="1507" y="4953000"/>
-            <a:ext cx="12188952" cy="1905000"/>
-          </a:xfrm>
-          <a:prstGeom prst="rect">
-            <a:avLst/>
-          </a:prstGeom>
-          <a:solidFill>
-            <a:schemeClr val="accent1">
-              <a:lumMod val="50000"/>
-            </a:schemeClr>
-          </a:solidFill>
-          <a:ln>
-            <a:noFill/>
-          </a:ln>
-        </p:spPr>
-        <p:style>
-          <a:lnRef idx="2">
-            <a:schemeClr val="accent1">
-              <a:shade val="50000"/>
-            </a:schemeClr>
-          </a:lnRef>
-          <a:fillRef idx="1">
-            <a:schemeClr val="accent1"/>
-          </a:fillRef>
-          <a:effectRef idx="0">
-            <a:schemeClr val="accent1"/>
-          </a:effectRef>
-          <a:fontRef idx="minor">
-            <a:schemeClr val="lt1"/>
-          </a:fontRef>
-        </p:style>
-      </p:sp>
-      <p:sp>
-        <p:nvSpPr>
-          <p:cNvPr id="2" name="Titel 1">
-            <a:extLst>
-              <a:ext uri="{FF2B5EF4-FFF2-40B4-BE49-F238E27FC236}">
-                <a16:creationId xmlns:a16="http://schemas.microsoft.com/office/drawing/2014/main" id="{299ED1C5-2372-4D17-8C63-7692DB9BA827}"/>
-              </a:ext>
-            </a:extLst>
-          </p:cNvPr>
-          <p:cNvSpPr>
-            <a:spLocks noGrp="1"/>
-          </p:cNvSpPr>
-          <p:nvPr>
-            <p:ph type="title"/>
-          </p:nvPr>
-        </p:nvSpPr>
-        <p:spPr>
-          <a:xfrm>
-            <a:off x="1065197" y="5120640"/>
-            <a:ext cx="10058400" cy="822960"/>
-          </a:xfrm>
-        </p:spPr>
-        <p:txBody>
-          <a:bodyPr vert="horz" lIns="91440" tIns="45720" rIns="91440" bIns="45720" rtlCol="0" anchor="b">
-            <a:normAutofit/>
-          </a:bodyPr>
-          <a:lstStyle/>
-          <a:p>
-            <a:r>
-              <a:rPr lang="en-US" sz="3600" dirty="0">
-                <a:solidFill>
-                  <a:srgbClr val="FFFFFF"/>
-                </a:solidFill>
-              </a:rPr>
-              <a:t>Perspective / View</a:t>
-            </a:r>
-          </a:p>
-        </p:txBody>
-      </p:sp>
-      <p:sp>
-        <p:nvSpPr>
-          <p:cNvPr id="18" name="Rectangle 17">
-            <a:extLst>
-              <a:ext uri="{FF2B5EF4-FFF2-40B4-BE49-F238E27FC236}">
-                <a16:creationId xmlns:a16="http://schemas.microsoft.com/office/drawing/2014/main" id="{D5AADE08-A85D-4367-AF35-82927B65BCD5}"/>
-              </a:ext>
-              <a:ext uri="{C183D7F6-B498-43B3-948B-1728B52AA6E4}">
-                <adec:decorative xmlns:adec="http://schemas.microsoft.com/office/drawing/2017/decorative" val="1"/>
-              </a:ext>
-            </a:extLst>
-          </p:cNvPr>
-          <p:cNvSpPr>
-            <a:spLocks noGrp="1" noRot="1" noChangeAspect="1" noMove="1" noResize="1" noEditPoints="1" noAdjustHandles="1" noChangeArrowheads="1" noChangeShapeType="1" noTextEdit="1"/>
-          </p:cNvSpPr>
-          <p:nvPr>
-            <p:extLst>
-              <p:ext uri="{386F3935-93C4-4BCD-93E2-E3B085C9AB24}">
-                <p16:designElem xmlns:p16="http://schemas.microsoft.com/office/powerpoint/2015/main" val="1"/>
-              </p:ext>
-            </p:extLst>
-          </p:nvPr>
-        </p:nvSpPr>
-        <p:spPr>
-          <a:xfrm>
-            <a:off x="1507" y="4906176"/>
-            <a:ext cx="12188952" cy="64008"/>
-          </a:xfrm>
-          <a:prstGeom prst="rect">
-            <a:avLst/>
-          </a:prstGeom>
-          <a:solidFill>
-            <a:schemeClr val="accent1"/>
-          </a:solidFill>
-          <a:ln>
-            <a:noFill/>
-          </a:ln>
-        </p:spPr>
-        <p:style>
-          <a:lnRef idx="2">
-            <a:schemeClr val="accent1">
-              <a:shade val="50000"/>
-            </a:schemeClr>
-          </a:lnRef>
-          <a:fillRef idx="1">
-            <a:schemeClr val="accent1"/>
-          </a:fillRef>
-          <a:effectRef idx="0">
-            <a:schemeClr val="accent1"/>
-          </a:effectRef>
-          <a:fontRef idx="minor">
-            <a:schemeClr val="lt1"/>
-          </a:fontRef>
-        </p:style>
-      </p:sp>
-      <p:pic>
-        <p:nvPicPr>
-          <p:cNvPr id="11" name="Inhaltsplatzhalter 10" descr="Ein Bild, das Text enthält.&#10;&#10;Automatisch generierte Beschreibung">
-            <a:extLst>
-              <a:ext uri="{FF2B5EF4-FFF2-40B4-BE49-F238E27FC236}">
-                <a16:creationId xmlns:a16="http://schemas.microsoft.com/office/drawing/2014/main" id="{015F3B47-6CEE-4316-9498-07BE6723DCDB}"/>
-              </a:ext>
-            </a:extLst>
-          </p:cNvPr>
-          <p:cNvPicPr>
-            <a:picLocks noGrp="1" noChangeAspect="1"/>
-          </p:cNvPicPr>
-          <p:nvPr>
-            <p:ph idx="1"/>
-          </p:nvPr>
-        </p:nvPicPr>
-        <p:blipFill>
-          <a:blip r:embed="rId2">
-            <a:extLst>
-              <a:ext uri="{28A0092B-C50C-407E-A947-70E740481C1C}">
-                <a14:useLocalDpi xmlns:a14="http://schemas.microsoft.com/office/drawing/2010/main" val="0"/>
-              </a:ext>
-            </a:extLst>
-          </a:blip>
-          <a:stretch>
-            <a:fillRect/>
-          </a:stretch>
-        </p:blipFill>
-        <p:spPr>
-          <a:xfrm>
-            <a:off x="824375" y="0"/>
-            <a:ext cx="10642085" cy="4896000"/>
-          </a:xfrm>
-        </p:spPr>
-      </p:pic>
-    </p:spTree>
-    <p:extLst>
-      <p:ext uri="{BB962C8B-B14F-4D97-AF65-F5344CB8AC3E}">
-        <p14:creationId xmlns:p14="http://schemas.microsoft.com/office/powerpoint/2010/main" val="1335712501"/>
-      </p:ext>
-    </p:extLst>
-  </p:cSld>
-  <p:clrMapOvr>
-    <a:masterClrMapping/>
-  </p:clrMapOvr>
-</p:sld>
-</file>
-
-<file path=ppt/slides/slide18.xml><?xml version="1.0" encoding="utf-8"?>
+<file path=ppt/slides/slide16.xml><?xml version="1.0" encoding="utf-8"?>
 <p:sld xmlns:a="http://schemas.openxmlformats.org/drawingml/2006/main" xmlns:r="http://schemas.openxmlformats.org/officeDocument/2006/relationships" xmlns:p="http://schemas.openxmlformats.org/presentationml/2006/main">
   <p:cSld>
     <p:spTree>
@@ -6949,7 +6163,7 @@
           <p:cNvPr id="2" name="Titel 1">
             <a:extLst>
               <a:ext uri="{FF2B5EF4-FFF2-40B4-BE49-F238E27FC236}">
-                <a16:creationId xmlns:a16="http://schemas.microsoft.com/office/drawing/2014/main" id="{D3579722-9D15-41B3-BBD2-84DD6BA11313}"/>
+                <a16:creationId xmlns:a16="http://schemas.microsoft.com/office/drawing/2014/main" id="{967B5354-85D0-418E-9C94-09080167BE9B}"/>
               </a:ext>
             </a:extLst>
           </p:cNvPr>
@@ -6966,56 +6180,48 @@
           <a:lstStyle/>
           <a:p>
             <a:r>
-              <a:rPr lang="en-US" sz="4800" dirty="0">
-                <a:solidFill>
-                  <a:srgbClr val="FFFFFF"/>
-                </a:solidFill>
-              </a:rPr>
-              <a:t>Perspective / View</a:t>
+              <a:rPr lang="de-AT" dirty="0"/>
+              <a:t>Code </a:t>
+            </a:r>
+            <a:r>
+              <a:rPr lang="de-AT" dirty="0" err="1"/>
+              <a:t>snippets</a:t>
             </a:r>
             <a:endParaRPr lang="de-AT" dirty="0"/>
           </a:p>
         </p:txBody>
       </p:sp>
-      <p:pic>
-        <p:nvPicPr>
-          <p:cNvPr id="5" name="Inhaltsplatzhalter 4" descr="Ein Bild, das Text enthält.&#10;&#10;Automatisch generierte Beschreibung">
+      <p:sp>
+        <p:nvSpPr>
+          <p:cNvPr id="3" name="Inhaltsplatzhalter 2">
             <a:extLst>
               <a:ext uri="{FF2B5EF4-FFF2-40B4-BE49-F238E27FC236}">
-                <a16:creationId xmlns:a16="http://schemas.microsoft.com/office/drawing/2014/main" id="{013940FA-AE63-472C-9C64-2AFAFAA89285}"/>
+                <a16:creationId xmlns:a16="http://schemas.microsoft.com/office/drawing/2014/main" id="{5F54A680-3E4F-41DA-AC0D-5BCC29C20F02}"/>
               </a:ext>
             </a:extLst>
           </p:cNvPr>
-          <p:cNvPicPr>
-            <a:picLocks noGrp="1" noChangeAspect="1"/>
-          </p:cNvPicPr>
+          <p:cNvSpPr>
+            <a:spLocks noGrp="1"/>
+          </p:cNvSpPr>
           <p:nvPr>
             <p:ph idx="1"/>
           </p:nvPr>
-        </p:nvPicPr>
-        <p:blipFill>
-          <a:blip r:embed="rId2">
-            <a:extLst>
-              <a:ext uri="{28A0092B-C50C-407E-A947-70E740481C1C}">
-                <a14:useLocalDpi xmlns:a14="http://schemas.microsoft.com/office/drawing/2010/main" val="0"/>
-              </a:ext>
-            </a:extLst>
-          </a:blip>
-          <a:stretch>
-            <a:fillRect/>
-          </a:stretch>
-        </p:blipFill>
-        <p:spPr>
-          <a:xfrm>
-            <a:off x="1097280" y="2372449"/>
-            <a:ext cx="6674994" cy="2340000"/>
-          </a:xfrm>
-        </p:spPr>
-      </p:pic>
+        </p:nvSpPr>
+        <p:spPr/>
+        <p:txBody>
+          <a:bodyPr>
+            <a:normAutofit/>
+          </a:bodyPr>
+          <a:lstStyle/>
+          <a:p>
+            <a:endParaRPr lang="de-AT" sz="2400" dirty="0"/>
+          </a:p>
+        </p:txBody>
+      </p:sp>
     </p:spTree>
     <p:extLst>
       <p:ext uri="{BB962C8B-B14F-4D97-AF65-F5344CB8AC3E}">
-        <p14:creationId xmlns:p14="http://schemas.microsoft.com/office/powerpoint/2010/main" val="1689369632"/>
+        <p14:creationId xmlns:p14="http://schemas.microsoft.com/office/powerpoint/2010/main" val="2779472713"/>
       </p:ext>
     </p:extLst>
   </p:cSld>
@@ -7025,17 +6231,9 @@
 </p:sld>
 </file>
 
-<file path=ppt/slides/slide19.xml><?xml version="1.0" encoding="utf-8"?>
+<file path=ppt/slides/slide17.xml><?xml version="1.0" encoding="utf-8"?>
 <p:sld xmlns:a="http://schemas.openxmlformats.org/drawingml/2006/main" xmlns:r="http://schemas.openxmlformats.org/officeDocument/2006/relationships" xmlns:p="http://schemas.openxmlformats.org/presentationml/2006/main">
   <p:cSld>
-    <p:bg>
-      <p:bgPr>
-        <a:solidFill>
-          <a:schemeClr val="bg2"/>
-        </a:solidFill>
-        <a:effectLst/>
-      </p:bgPr>
-    </p:bg>
     <p:spTree>
       <p:nvGrpSpPr>
         <p:cNvPr id="1" name=""/>
@@ -7050,228 +6248,96 @@
           <a:chExt cx="0" cy="0"/>
         </a:xfrm>
       </p:grpSpPr>
-      <p:sp useBgFill="1">
-        <p:nvSpPr>
-          <p:cNvPr id="10" name="Rectangle 9">
+      <p:sp>
+        <p:nvSpPr>
+          <p:cNvPr id="2" name="Titel 1">
             <a:extLst>
               <a:ext uri="{FF2B5EF4-FFF2-40B4-BE49-F238E27FC236}">
-                <a16:creationId xmlns:a16="http://schemas.microsoft.com/office/drawing/2014/main" id="{05670695-BABB-487A-9D4A-6B549E1C4F3C}"/>
-              </a:ext>
-              <a:ext uri="{C183D7F6-B498-43B3-948B-1728B52AA6E4}">
-                <adec:decorative xmlns:adec="http://schemas.microsoft.com/office/drawing/2017/decorative" val="1"/>
+                <a16:creationId xmlns:a16="http://schemas.microsoft.com/office/drawing/2014/main" id="{6133FD2E-2867-4FFA-98C2-5B986EC1B5B1}"/>
               </a:ext>
             </a:extLst>
           </p:cNvPr>
           <p:cNvSpPr>
-            <a:spLocks noGrp="1" noRot="1" noChangeAspect="1" noMove="1" noResize="1" noEditPoints="1" noAdjustHandles="1" noChangeArrowheads="1" noChangeShapeType="1" noTextEdit="1"/>
-          </p:cNvSpPr>
-          <p:nvPr>
-            <p:extLst>
-              <p:ext uri="{386F3935-93C4-4BCD-93E2-E3B085C9AB24}">
-                <p16:designElem xmlns:p16="http://schemas.microsoft.com/office/powerpoint/2015/main" val="1"/>
-              </p:ext>
-            </p:extLst>
-          </p:nvPr>
-        </p:nvSpPr>
-        <p:spPr>
-          <a:xfrm>
-            <a:off x="0" y="0"/>
-            <a:ext cx="12186315" cy="6858000"/>
-          </a:xfrm>
-          <a:prstGeom prst="rect">
-            <a:avLst/>
-          </a:prstGeom>
-          <a:ln>
-            <a:noFill/>
-          </a:ln>
-        </p:spPr>
-        <p:style>
-          <a:lnRef idx="2">
-            <a:schemeClr val="accent6">
-              <a:shade val="50000"/>
-            </a:schemeClr>
-          </a:lnRef>
-          <a:fillRef idx="1001">
-            <a:schemeClr val="lt1"/>
-          </a:fillRef>
-          <a:effectRef idx="0">
-            <a:schemeClr val="accent6"/>
-          </a:effectRef>
-          <a:fontRef idx="minor">
-            <a:schemeClr val="lt1"/>
-          </a:fontRef>
-        </p:style>
-        <p:txBody>
-          <a:bodyPr rtlCol="0" anchor="ctr"/>
+            <a:spLocks noGrp="1"/>
+          </p:cNvSpPr>
+          <p:nvPr>
+            <p:ph type="title"/>
+          </p:nvPr>
+        </p:nvSpPr>
+        <p:spPr/>
+        <p:txBody>
+          <a:bodyPr/>
           <a:lstStyle/>
           <a:p>
-            <a:pPr algn="ctr"/>
-            <a:endParaRPr lang="en-US"/>
-          </a:p>
-        </p:txBody>
-      </p:sp>
-      <p:sp>
-        <p:nvSpPr>
-          <p:cNvPr id="12" name="Rectangle 11">
+            <a:r>
+              <a:rPr lang="de-DE" dirty="0"/>
+              <a:t>Demo</a:t>
+            </a:r>
+            <a:endParaRPr lang="de-AT" dirty="0"/>
+          </a:p>
+        </p:txBody>
+      </p:sp>
+      <p:sp>
+        <p:nvSpPr>
+          <p:cNvPr id="3" name="Inhaltsplatzhalter 2">
             <a:extLst>
               <a:ext uri="{FF2B5EF4-FFF2-40B4-BE49-F238E27FC236}">
-                <a16:creationId xmlns:a16="http://schemas.microsoft.com/office/drawing/2014/main" id="{0E639418-A68B-41C9-8706-DAD1D3E21DE1}"/>
-              </a:ext>
-              <a:ext uri="{C183D7F6-B498-43B3-948B-1728B52AA6E4}">
-                <adec:decorative xmlns:adec="http://schemas.microsoft.com/office/drawing/2017/decorative" val="1"/>
+                <a16:creationId xmlns:a16="http://schemas.microsoft.com/office/drawing/2014/main" id="{D5AC4917-B605-4C37-B864-0B39ED2D7971}"/>
               </a:ext>
             </a:extLst>
           </p:cNvPr>
           <p:cNvSpPr>
-            <a:spLocks noGrp="1" noRot="1" noChangeAspect="1" noMove="1" noResize="1" noEditPoints="1" noAdjustHandles="1" noChangeArrowheads="1" noChangeShapeType="1" noTextEdit="1"/>
-          </p:cNvSpPr>
-          <p:nvPr>
-            <p:extLst>
-              <p:ext uri="{386F3935-93C4-4BCD-93E2-E3B085C9AB24}">
-                <p16:designElem xmlns:p16="http://schemas.microsoft.com/office/powerpoint/2015/main" val="1"/>
-              </p:ext>
-            </p:extLst>
-          </p:nvPr>
-        </p:nvSpPr>
-        <p:spPr>
-          <a:xfrm>
-            <a:off x="16" y="0"/>
-            <a:ext cx="4050791" cy="6858000"/>
-          </a:xfrm>
-          <a:prstGeom prst="rect">
-            <a:avLst/>
-          </a:prstGeom>
-          <a:solidFill>
-            <a:schemeClr val="accent1">
-              <a:lumMod val="50000"/>
-            </a:schemeClr>
-          </a:solidFill>
-          <a:ln>
-            <a:noFill/>
-          </a:ln>
-        </p:spPr>
-        <p:style>
-          <a:lnRef idx="2">
-            <a:schemeClr val="accent1">
-              <a:shade val="50000"/>
-            </a:schemeClr>
-          </a:lnRef>
-          <a:fillRef idx="1">
-            <a:schemeClr val="accent1"/>
-          </a:fillRef>
-          <a:effectRef idx="0">
-            <a:schemeClr val="accent1"/>
-          </a:effectRef>
-          <a:fontRef idx="minor">
-            <a:schemeClr val="lt1"/>
-          </a:fontRef>
-        </p:style>
-      </p:sp>
-      <p:sp>
-        <p:nvSpPr>
-          <p:cNvPr id="2" name="Titel 1">
-            <a:extLst>
-              <a:ext uri="{FF2B5EF4-FFF2-40B4-BE49-F238E27FC236}">
-                <a16:creationId xmlns:a16="http://schemas.microsoft.com/office/drawing/2014/main" id="{FB802FF9-04D8-4652-942F-8F50B2ABD29A}"/>
-              </a:ext>
-            </a:extLst>
-          </p:cNvPr>
-          <p:cNvSpPr>
-            <a:spLocks noGrp="1"/>
-          </p:cNvSpPr>
-          <p:nvPr>
-            <p:ph type="title"/>
-          </p:nvPr>
-        </p:nvSpPr>
-        <p:spPr>
-          <a:xfrm>
-            <a:off x="492370" y="516835"/>
-            <a:ext cx="3084844" cy="2103875"/>
-          </a:xfrm>
-        </p:spPr>
-        <p:txBody>
-          <a:bodyPr>
-            <a:normAutofit/>
-          </a:bodyPr>
+            <a:spLocks noGrp="1"/>
+          </p:cNvSpPr>
+          <p:nvPr>
+            <p:ph idx="1"/>
+          </p:nvPr>
+        </p:nvSpPr>
+        <p:spPr/>
+        <p:txBody>
+          <a:bodyPr/>
           <a:lstStyle/>
           <a:p>
-            <a:r>
-              <a:rPr lang="de-DE" sz="3600">
-                <a:solidFill>
-                  <a:srgbClr val="FFFFFF"/>
-                </a:solidFill>
-              </a:rPr>
-              <a:t>Shaders</a:t>
-            </a:r>
-            <a:endParaRPr lang="de-AT" sz="3600">
-              <a:solidFill>
-                <a:srgbClr val="FFFFFF"/>
-              </a:solidFill>
-            </a:endParaRPr>
-          </a:p>
-        </p:txBody>
-      </p:sp>
-      <p:sp>
-        <p:nvSpPr>
-          <p:cNvPr id="14" name="Rectangle 13">
-            <a:extLst>
-              <a:ext uri="{FF2B5EF4-FFF2-40B4-BE49-F238E27FC236}">
-                <a16:creationId xmlns:a16="http://schemas.microsoft.com/office/drawing/2014/main" id="{E579711D-7383-441E-8339-9A2B566677DB}"/>
-              </a:ext>
-              <a:ext uri="{C183D7F6-B498-43B3-948B-1728B52AA6E4}">
-                <adec:decorative xmlns:adec="http://schemas.microsoft.com/office/drawing/2017/decorative" val="1"/>
-              </a:ext>
-            </a:extLst>
-          </p:cNvPr>
-          <p:cNvSpPr>
-            <a:spLocks noGrp="1" noRot="1" noChangeAspect="1" noMove="1" noResize="1" noEditPoints="1" noAdjustHandles="1" noChangeArrowheads="1" noChangeShapeType="1" noTextEdit="1"/>
-          </p:cNvSpPr>
-          <p:nvPr>
-            <p:extLst>
-              <p:ext uri="{386F3935-93C4-4BCD-93E2-E3B085C9AB24}">
-                <p16:designElem xmlns:p16="http://schemas.microsoft.com/office/powerpoint/2015/main" val="1"/>
-              </p:ext>
-            </p:extLst>
-          </p:nvPr>
-        </p:nvSpPr>
-        <p:spPr>
-          <a:xfrm>
-            <a:off x="4040071" y="0"/>
-            <a:ext cx="64008" cy="6858000"/>
-          </a:xfrm>
-          <a:prstGeom prst="rect">
-            <a:avLst/>
-          </a:prstGeom>
-          <a:solidFill>
-            <a:schemeClr val="accent1"/>
-          </a:solidFill>
-          <a:ln>
-            <a:noFill/>
-          </a:ln>
-        </p:spPr>
-        <p:style>
-          <a:lnRef idx="2">
-            <a:schemeClr val="accent1">
-              <a:shade val="50000"/>
-            </a:schemeClr>
-          </a:lnRef>
-          <a:fillRef idx="1">
-            <a:schemeClr val="accent1"/>
-          </a:fillRef>
-          <a:effectRef idx="0">
-            <a:schemeClr val="accent1"/>
-          </a:effectRef>
-          <a:fontRef idx="minor">
-            <a:schemeClr val="lt1"/>
-          </a:fontRef>
-        </p:style>
-      </p:sp>
+            <a:endParaRPr lang="de-AT"/>
+          </a:p>
+        </p:txBody>
+      </p:sp>
+    </p:spTree>
+    <p:extLst>
+      <p:ext uri="{BB962C8B-B14F-4D97-AF65-F5344CB8AC3E}">
+        <p14:creationId xmlns:p14="http://schemas.microsoft.com/office/powerpoint/2010/main" val="2831428590"/>
+      </p:ext>
+    </p:extLst>
+  </p:cSld>
+  <p:clrMapOvr>
+    <a:masterClrMapping/>
+  </p:clrMapOvr>
+</p:sld>
+</file>
+
+<file path=ppt/slides/slide18.xml><?xml version="1.0" encoding="utf-8"?>
+<p:sld xmlns:a="http://schemas.openxmlformats.org/drawingml/2006/main" xmlns:r="http://schemas.openxmlformats.org/officeDocument/2006/relationships" xmlns:p="http://schemas.openxmlformats.org/presentationml/2006/main" showMasterSp="0">
+  <p:cSld>
+    <p:spTree>
+      <p:nvGrpSpPr>
+        <p:cNvPr id="1" name=""/>
+        <p:cNvGrpSpPr/>
+        <p:nvPr/>
+      </p:nvGrpSpPr>
+      <p:grpSpPr>
+        <a:xfrm>
+          <a:off x="0" y="0"/>
+          <a:ext cx="0" cy="0"/>
+          <a:chOff x="0" y="0"/>
+          <a:chExt cx="0" cy="0"/>
+        </a:xfrm>
+      </p:grpSpPr>
       <p:pic>
         <p:nvPicPr>
-          <p:cNvPr id="6" name="Grafik 5" descr="Ein Bild, das Text enthält.&#10;&#10;Automatisch generierte Beschreibung">
+          <p:cNvPr id="6" name="Grafik 5">
             <a:extLst>
               <a:ext uri="{FF2B5EF4-FFF2-40B4-BE49-F238E27FC236}">
-                <a16:creationId xmlns:a16="http://schemas.microsoft.com/office/drawing/2014/main" id="{E65AA5B8-5B53-45FE-B0CC-C35A22EF7A97}"/>
+                <a16:creationId xmlns:a16="http://schemas.microsoft.com/office/drawing/2014/main" id="{C9CC7FAD-9556-490E-BB8E-3359AD972DE9}"/>
               </a:ext>
             </a:extLst>
           </p:cNvPr>
@@ -7280,21 +6346,16 @@
           </p:cNvPicPr>
           <p:nvPr/>
         </p:nvPicPr>
-        <p:blipFill rotWithShape="1">
-          <a:blip r:embed="rId2">
-            <a:extLst>
-              <a:ext uri="{28A0092B-C50C-407E-A947-70E740481C1C}">
-                <a14:useLocalDpi xmlns:a14="http://schemas.microsoft.com/office/drawing/2010/main" val="0"/>
-              </a:ext>
-            </a:extLst>
-          </a:blip>
-          <a:srcRect l="6664"/>
-          <a:stretch/>
+        <p:blipFill>
+          <a:blip r:embed="rId2"/>
+          <a:stretch>
+            <a:fillRect/>
+          </a:stretch>
         </p:blipFill>
         <p:spPr>
           <a:xfrm>
-            <a:off x="812410" y="3347"/>
-            <a:ext cx="11379590" cy="6854653"/>
+            <a:off x="2656936" y="675000"/>
+            <a:ext cx="6878127" cy="5508000"/>
           </a:xfrm>
           <a:prstGeom prst="rect">
             <a:avLst/>
@@ -7304,7 +6365,7 @@
     </p:spTree>
     <p:extLst>
       <p:ext uri="{BB962C8B-B14F-4D97-AF65-F5344CB8AC3E}">
-        <p14:creationId xmlns:p14="http://schemas.microsoft.com/office/powerpoint/2010/main" val="438599437"/>
+        <p14:creationId xmlns:p14="http://schemas.microsoft.com/office/powerpoint/2010/main" val="1788630429"/>
       </p:ext>
     </p:extLst>
   </p:cSld>
@@ -7445,476 +6506,6 @@
     <p:extLst>
       <p:ext uri="{BB962C8B-B14F-4D97-AF65-F5344CB8AC3E}">
         <p14:creationId xmlns:p14="http://schemas.microsoft.com/office/powerpoint/2010/main" val="4095677151"/>
-      </p:ext>
-    </p:extLst>
-  </p:cSld>
-  <p:clrMapOvr>
-    <a:masterClrMapping/>
-  </p:clrMapOvr>
-</p:sld>
-</file>
-
-<file path=ppt/slides/slide20.xml><?xml version="1.0" encoding="utf-8"?>
-<p:sld xmlns:a="http://schemas.openxmlformats.org/drawingml/2006/main" xmlns:r="http://schemas.openxmlformats.org/officeDocument/2006/relationships" xmlns:p="http://schemas.openxmlformats.org/presentationml/2006/main">
-  <p:cSld>
-    <p:bg>
-      <p:bgPr>
-        <a:solidFill>
-          <a:schemeClr val="bg2"/>
-        </a:solidFill>
-        <a:effectLst/>
-      </p:bgPr>
-    </p:bg>
-    <p:spTree>
-      <p:nvGrpSpPr>
-        <p:cNvPr id="1" name=""/>
-        <p:cNvGrpSpPr/>
-        <p:nvPr/>
-      </p:nvGrpSpPr>
-      <p:grpSpPr>
-        <a:xfrm>
-          <a:off x="0" y="0"/>
-          <a:ext cx="0" cy="0"/>
-          <a:chOff x="0" y="0"/>
-          <a:chExt cx="0" cy="0"/>
-        </a:xfrm>
-      </p:grpSpPr>
-      <p:sp useBgFill="1">
-        <p:nvSpPr>
-          <p:cNvPr id="12" name="Rectangle 11">
-            <a:extLst>
-              <a:ext uri="{FF2B5EF4-FFF2-40B4-BE49-F238E27FC236}">
-                <a16:creationId xmlns:a16="http://schemas.microsoft.com/office/drawing/2014/main" id="{05670695-BABB-487A-9D4A-6B549E1C4F3C}"/>
-              </a:ext>
-              <a:ext uri="{C183D7F6-B498-43B3-948B-1728B52AA6E4}">
-                <adec:decorative xmlns:adec="http://schemas.microsoft.com/office/drawing/2017/decorative" val="1"/>
-              </a:ext>
-            </a:extLst>
-          </p:cNvPr>
-          <p:cNvSpPr>
-            <a:spLocks noGrp="1" noRot="1" noChangeAspect="1" noMove="1" noResize="1" noEditPoints="1" noAdjustHandles="1" noChangeArrowheads="1" noChangeShapeType="1" noTextEdit="1"/>
-          </p:cNvSpPr>
-          <p:nvPr>
-            <p:extLst>
-              <p:ext uri="{386F3935-93C4-4BCD-93E2-E3B085C9AB24}">
-                <p16:designElem xmlns:p16="http://schemas.microsoft.com/office/powerpoint/2015/main" val="1"/>
-              </p:ext>
-            </p:extLst>
-          </p:nvPr>
-        </p:nvSpPr>
-        <p:spPr>
-          <a:xfrm>
-            <a:off x="0" y="0"/>
-            <a:ext cx="12186315" cy="6858000"/>
-          </a:xfrm>
-          <a:prstGeom prst="rect">
-            <a:avLst/>
-          </a:prstGeom>
-          <a:ln>
-            <a:noFill/>
-          </a:ln>
-        </p:spPr>
-        <p:style>
-          <a:lnRef idx="2">
-            <a:schemeClr val="accent6">
-              <a:shade val="50000"/>
-            </a:schemeClr>
-          </a:lnRef>
-          <a:fillRef idx="1001">
-            <a:schemeClr val="lt1"/>
-          </a:fillRef>
-          <a:effectRef idx="0">
-            <a:schemeClr val="accent6"/>
-          </a:effectRef>
-          <a:fontRef idx="minor">
-            <a:schemeClr val="lt1"/>
-          </a:fontRef>
-        </p:style>
-        <p:txBody>
-          <a:bodyPr rtlCol="0" anchor="ctr"/>
-          <a:lstStyle/>
-          <a:p>
-            <a:pPr algn="ctr"/>
-            <a:endParaRPr lang="en-US"/>
-          </a:p>
-        </p:txBody>
-      </p:sp>
-      <p:sp>
-        <p:nvSpPr>
-          <p:cNvPr id="14" name="Rectangle 13">
-            <a:extLst>
-              <a:ext uri="{FF2B5EF4-FFF2-40B4-BE49-F238E27FC236}">
-                <a16:creationId xmlns:a16="http://schemas.microsoft.com/office/drawing/2014/main" id="{0E639418-A68B-41C9-8706-DAD1D3E21DE1}"/>
-              </a:ext>
-              <a:ext uri="{C183D7F6-B498-43B3-948B-1728B52AA6E4}">
-                <adec:decorative xmlns:adec="http://schemas.microsoft.com/office/drawing/2017/decorative" val="1"/>
-              </a:ext>
-            </a:extLst>
-          </p:cNvPr>
-          <p:cNvSpPr>
-            <a:spLocks noGrp="1" noRot="1" noChangeAspect="1" noMove="1" noResize="1" noEditPoints="1" noAdjustHandles="1" noChangeArrowheads="1" noChangeShapeType="1" noTextEdit="1"/>
-          </p:cNvSpPr>
-          <p:nvPr>
-            <p:extLst>
-              <p:ext uri="{386F3935-93C4-4BCD-93E2-E3B085C9AB24}">
-                <p16:designElem xmlns:p16="http://schemas.microsoft.com/office/powerpoint/2015/main" val="1"/>
-              </p:ext>
-            </p:extLst>
-          </p:nvPr>
-        </p:nvSpPr>
-        <p:spPr>
-          <a:xfrm>
-            <a:off x="16" y="0"/>
-            <a:ext cx="4050791" cy="6858000"/>
-          </a:xfrm>
-          <a:prstGeom prst="rect">
-            <a:avLst/>
-          </a:prstGeom>
-          <a:solidFill>
-            <a:schemeClr val="accent1">
-              <a:lumMod val="50000"/>
-            </a:schemeClr>
-          </a:solidFill>
-          <a:ln>
-            <a:noFill/>
-          </a:ln>
-        </p:spPr>
-        <p:style>
-          <a:lnRef idx="2">
-            <a:schemeClr val="accent1">
-              <a:shade val="50000"/>
-            </a:schemeClr>
-          </a:lnRef>
-          <a:fillRef idx="1">
-            <a:schemeClr val="accent1"/>
-          </a:fillRef>
-          <a:effectRef idx="0">
-            <a:schemeClr val="accent1"/>
-          </a:effectRef>
-          <a:fontRef idx="minor">
-            <a:schemeClr val="lt1"/>
-          </a:fontRef>
-        </p:style>
-      </p:sp>
-      <p:sp>
-        <p:nvSpPr>
-          <p:cNvPr id="2" name="Titel 1">
-            <a:extLst>
-              <a:ext uri="{FF2B5EF4-FFF2-40B4-BE49-F238E27FC236}">
-                <a16:creationId xmlns:a16="http://schemas.microsoft.com/office/drawing/2014/main" id="{79A32583-8E09-487C-A962-9B147266A792}"/>
-              </a:ext>
-            </a:extLst>
-          </p:cNvPr>
-          <p:cNvSpPr>
-            <a:spLocks noGrp="1"/>
-          </p:cNvSpPr>
-          <p:nvPr>
-            <p:ph type="title"/>
-          </p:nvPr>
-        </p:nvSpPr>
-        <p:spPr>
-          <a:xfrm>
-            <a:off x="492370" y="516835"/>
-            <a:ext cx="3084844" cy="2103875"/>
-          </a:xfrm>
-        </p:spPr>
-        <p:txBody>
-          <a:bodyPr>
-            <a:normAutofit/>
-          </a:bodyPr>
-          <a:lstStyle/>
-          <a:p>
-            <a:r>
-              <a:rPr lang="de-DE" sz="3600" dirty="0">
-                <a:solidFill>
-                  <a:srgbClr val="FFFFFF"/>
-                </a:solidFill>
-              </a:rPr>
-              <a:t>Shaders</a:t>
-            </a:r>
-            <a:endParaRPr lang="de-AT" sz="3600" dirty="0">
-              <a:solidFill>
-                <a:srgbClr val="FFFFFF"/>
-              </a:solidFill>
-            </a:endParaRPr>
-          </a:p>
-        </p:txBody>
-      </p:sp>
-      <p:sp>
-        <p:nvSpPr>
-          <p:cNvPr id="9" name="Content Placeholder 8">
-            <a:extLst>
-              <a:ext uri="{FF2B5EF4-FFF2-40B4-BE49-F238E27FC236}">
-                <a16:creationId xmlns:a16="http://schemas.microsoft.com/office/drawing/2014/main" id="{2BA7E0E7-50A9-470B-865F-8F306ADE8DF6}"/>
-              </a:ext>
-            </a:extLst>
-          </p:cNvPr>
-          <p:cNvSpPr>
-            <a:spLocks noGrp="1"/>
-          </p:cNvSpPr>
-          <p:nvPr>
-            <p:ph idx="1"/>
-          </p:nvPr>
-        </p:nvSpPr>
-        <p:spPr>
-          <a:xfrm>
-            <a:off x="492371" y="2653800"/>
-            <a:ext cx="3084844" cy="3335519"/>
-          </a:xfrm>
-        </p:spPr>
-        <p:txBody>
-          <a:bodyPr>
-            <a:normAutofit/>
-          </a:bodyPr>
-          <a:lstStyle/>
-          <a:p>
-            <a:endParaRPr lang="en-US" sz="1500">
-              <a:solidFill>
-                <a:srgbClr val="FFFFFF"/>
-              </a:solidFill>
-            </a:endParaRPr>
-          </a:p>
-        </p:txBody>
-      </p:sp>
-      <p:sp>
-        <p:nvSpPr>
-          <p:cNvPr id="16" name="Rectangle 15">
-            <a:extLst>
-              <a:ext uri="{FF2B5EF4-FFF2-40B4-BE49-F238E27FC236}">
-                <a16:creationId xmlns:a16="http://schemas.microsoft.com/office/drawing/2014/main" id="{E579711D-7383-441E-8339-9A2B566677DB}"/>
-              </a:ext>
-              <a:ext uri="{C183D7F6-B498-43B3-948B-1728B52AA6E4}">
-                <adec:decorative xmlns:adec="http://schemas.microsoft.com/office/drawing/2017/decorative" val="1"/>
-              </a:ext>
-            </a:extLst>
-          </p:cNvPr>
-          <p:cNvSpPr>
-            <a:spLocks noGrp="1" noRot="1" noChangeAspect="1" noMove="1" noResize="1" noEditPoints="1" noAdjustHandles="1" noChangeArrowheads="1" noChangeShapeType="1" noTextEdit="1"/>
-          </p:cNvSpPr>
-          <p:nvPr>
-            <p:extLst>
-              <p:ext uri="{386F3935-93C4-4BCD-93E2-E3B085C9AB24}">
-                <p16:designElem xmlns:p16="http://schemas.microsoft.com/office/powerpoint/2015/main" val="1"/>
-              </p:ext>
-            </p:extLst>
-          </p:nvPr>
-        </p:nvSpPr>
-        <p:spPr>
-          <a:xfrm>
-            <a:off x="4040071" y="0"/>
-            <a:ext cx="64008" cy="6858000"/>
-          </a:xfrm>
-          <a:prstGeom prst="rect">
-            <a:avLst/>
-          </a:prstGeom>
-          <a:solidFill>
-            <a:schemeClr val="accent1"/>
-          </a:solidFill>
-          <a:ln>
-            <a:noFill/>
-          </a:ln>
-        </p:spPr>
-        <p:style>
-          <a:lnRef idx="2">
-            <a:schemeClr val="accent1">
-              <a:shade val="50000"/>
-            </a:schemeClr>
-          </a:lnRef>
-          <a:fillRef idx="1">
-            <a:schemeClr val="accent1"/>
-          </a:fillRef>
-          <a:effectRef idx="0">
-            <a:schemeClr val="accent1"/>
-          </a:effectRef>
-          <a:fontRef idx="minor">
-            <a:schemeClr val="lt1"/>
-          </a:fontRef>
-        </p:style>
-      </p:sp>
-      <p:pic>
-        <p:nvPicPr>
-          <p:cNvPr id="5" name="Inhaltsplatzhalter 4" descr="Ein Bild, das Text enthält.&#10;&#10;Automatisch generierte Beschreibung">
-            <a:extLst>
-              <a:ext uri="{FF2B5EF4-FFF2-40B4-BE49-F238E27FC236}">
-                <a16:creationId xmlns:a16="http://schemas.microsoft.com/office/drawing/2014/main" id="{CA23BF1B-5F34-49C4-B266-96BBF9A15592}"/>
-              </a:ext>
-            </a:extLst>
-          </p:cNvPr>
-          <p:cNvPicPr>
-            <a:picLocks noChangeAspect="1"/>
-          </p:cNvPicPr>
-          <p:nvPr/>
-        </p:nvPicPr>
-        <p:blipFill>
-          <a:blip r:embed="rId2">
-            <a:extLst>
-              <a:ext uri="{28A0092B-C50C-407E-A947-70E740481C1C}">
-                <a14:useLocalDpi xmlns:a14="http://schemas.microsoft.com/office/drawing/2010/main" val="0"/>
-              </a:ext>
-            </a:extLst>
-          </a:blip>
-          <a:stretch>
-            <a:fillRect/>
-          </a:stretch>
-        </p:blipFill>
-        <p:spPr>
-          <a:xfrm>
-            <a:off x="4108644" y="-54000"/>
-            <a:ext cx="7017250" cy="6912000"/>
-          </a:xfrm>
-          <a:prstGeom prst="rect">
-            <a:avLst/>
-          </a:prstGeom>
-        </p:spPr>
-      </p:pic>
-    </p:spTree>
-    <p:extLst>
-      <p:ext uri="{BB962C8B-B14F-4D97-AF65-F5344CB8AC3E}">
-        <p14:creationId xmlns:p14="http://schemas.microsoft.com/office/powerpoint/2010/main" val="937389746"/>
-      </p:ext>
-    </p:extLst>
-  </p:cSld>
-  <p:clrMapOvr>
-    <a:masterClrMapping/>
-  </p:clrMapOvr>
-</p:sld>
-</file>
-
-<file path=ppt/slides/slide21.xml><?xml version="1.0" encoding="utf-8"?>
-<p:sld xmlns:a="http://schemas.openxmlformats.org/drawingml/2006/main" xmlns:r="http://schemas.openxmlformats.org/officeDocument/2006/relationships" xmlns:p="http://schemas.openxmlformats.org/presentationml/2006/main">
-  <p:cSld>
-    <p:spTree>
-      <p:nvGrpSpPr>
-        <p:cNvPr id="1" name=""/>
-        <p:cNvGrpSpPr/>
-        <p:nvPr/>
-      </p:nvGrpSpPr>
-      <p:grpSpPr>
-        <a:xfrm>
-          <a:off x="0" y="0"/>
-          <a:ext cx="0" cy="0"/>
-          <a:chOff x="0" y="0"/>
-          <a:chExt cx="0" cy="0"/>
-        </a:xfrm>
-      </p:grpSpPr>
-      <p:sp>
-        <p:nvSpPr>
-          <p:cNvPr id="2" name="Titel 1">
-            <a:extLst>
-              <a:ext uri="{FF2B5EF4-FFF2-40B4-BE49-F238E27FC236}">
-                <a16:creationId xmlns:a16="http://schemas.microsoft.com/office/drawing/2014/main" id="{6133FD2E-2867-4FFA-98C2-5B986EC1B5B1}"/>
-              </a:ext>
-            </a:extLst>
-          </p:cNvPr>
-          <p:cNvSpPr>
-            <a:spLocks noGrp="1"/>
-          </p:cNvSpPr>
-          <p:nvPr>
-            <p:ph type="title"/>
-          </p:nvPr>
-        </p:nvSpPr>
-        <p:spPr/>
-        <p:txBody>
-          <a:bodyPr/>
-          <a:lstStyle/>
-          <a:p>
-            <a:r>
-              <a:rPr lang="de-DE" dirty="0"/>
-              <a:t>Demo</a:t>
-            </a:r>
-            <a:endParaRPr lang="de-AT" dirty="0"/>
-          </a:p>
-        </p:txBody>
-      </p:sp>
-      <p:sp>
-        <p:nvSpPr>
-          <p:cNvPr id="3" name="Inhaltsplatzhalter 2">
-            <a:extLst>
-              <a:ext uri="{FF2B5EF4-FFF2-40B4-BE49-F238E27FC236}">
-                <a16:creationId xmlns:a16="http://schemas.microsoft.com/office/drawing/2014/main" id="{D5AC4917-B605-4C37-B864-0B39ED2D7971}"/>
-              </a:ext>
-            </a:extLst>
-          </p:cNvPr>
-          <p:cNvSpPr>
-            <a:spLocks noGrp="1"/>
-          </p:cNvSpPr>
-          <p:nvPr>
-            <p:ph idx="1"/>
-          </p:nvPr>
-        </p:nvSpPr>
-        <p:spPr/>
-        <p:txBody>
-          <a:bodyPr/>
-          <a:lstStyle/>
-          <a:p>
-            <a:endParaRPr lang="de-AT"/>
-          </a:p>
-        </p:txBody>
-      </p:sp>
-    </p:spTree>
-    <p:extLst>
-      <p:ext uri="{BB962C8B-B14F-4D97-AF65-F5344CB8AC3E}">
-        <p14:creationId xmlns:p14="http://schemas.microsoft.com/office/powerpoint/2010/main" val="2831428590"/>
-      </p:ext>
-    </p:extLst>
-  </p:cSld>
-  <p:clrMapOvr>
-    <a:masterClrMapping/>
-  </p:clrMapOvr>
-</p:sld>
-</file>
-
-<file path=ppt/slides/slide22.xml><?xml version="1.0" encoding="utf-8"?>
-<p:sld xmlns:a="http://schemas.openxmlformats.org/drawingml/2006/main" xmlns:r="http://schemas.openxmlformats.org/officeDocument/2006/relationships" xmlns:p="http://schemas.openxmlformats.org/presentationml/2006/main" showMasterSp="0">
-  <p:cSld>
-    <p:spTree>
-      <p:nvGrpSpPr>
-        <p:cNvPr id="1" name=""/>
-        <p:cNvGrpSpPr/>
-        <p:nvPr/>
-      </p:nvGrpSpPr>
-      <p:grpSpPr>
-        <a:xfrm>
-          <a:off x="0" y="0"/>
-          <a:ext cx="0" cy="0"/>
-          <a:chOff x="0" y="0"/>
-          <a:chExt cx="0" cy="0"/>
-        </a:xfrm>
-      </p:grpSpPr>
-      <p:pic>
-        <p:nvPicPr>
-          <p:cNvPr id="6" name="Grafik 5">
-            <a:extLst>
-              <a:ext uri="{FF2B5EF4-FFF2-40B4-BE49-F238E27FC236}">
-                <a16:creationId xmlns:a16="http://schemas.microsoft.com/office/drawing/2014/main" id="{C9CC7FAD-9556-490E-BB8E-3359AD972DE9}"/>
-              </a:ext>
-            </a:extLst>
-          </p:cNvPr>
-          <p:cNvPicPr>
-            <a:picLocks noChangeAspect="1"/>
-          </p:cNvPicPr>
-          <p:nvPr/>
-        </p:nvPicPr>
-        <p:blipFill>
-          <a:blip r:embed="rId2"/>
-          <a:stretch>
-            <a:fillRect/>
-          </a:stretch>
-        </p:blipFill>
-        <p:spPr>
-          <a:xfrm>
-            <a:off x="2656936" y="675000"/>
-            <a:ext cx="6878127" cy="5508000"/>
-          </a:xfrm>
-          <a:prstGeom prst="rect">
-            <a:avLst/>
-          </a:prstGeom>
-        </p:spPr>
-      </p:pic>
-    </p:spTree>
-    <p:extLst>
-      <p:ext uri="{BB962C8B-B14F-4D97-AF65-F5344CB8AC3E}">
-        <p14:creationId xmlns:p14="http://schemas.microsoft.com/office/powerpoint/2010/main" val="1788630429"/>
       </p:ext>
     </p:extLst>
   </p:cSld>

</xml_diff>